<commit_message>
added further git pull instructions
</commit_message>
<xml_diff>
--- a/2-python/PythonPrimer.pptx
+++ b/2-python/PythonPrimer.pptx
@@ -5624,19 +5624,7 @@
             <a:pPr lvl="1"/>
             <a:r>
               <a:rPr lang="en-US" dirty="0" smtClean="0"/>
-              <a:t>Select</a:t>
-            </a:r>
-            <a:r>
-              <a:rPr lang="en-US" dirty="0" smtClean="0"/>
-              <a:t> </a:t>
-            </a:r>
-            <a:r>
-              <a:rPr lang="en-US" dirty="0" smtClean="0"/>
-              <a:t>GNOME </a:t>
-            </a:r>
-            <a:r>
-              <a:rPr lang="en-US" dirty="0" smtClean="0"/>
-              <a:t>Desktop</a:t>
+              <a:t>Select GNOME Desktop</a:t>
             </a:r>
           </a:p>
           <a:p>
@@ -5645,7 +5633,6 @@
               <a:rPr lang="en-US" dirty="0" smtClean="0"/>
               <a:t>Click Launch</a:t>
             </a:r>
-            <a:endParaRPr lang="en-US" dirty="0" smtClean="0"/>
           </a:p>
           <a:p>
             <a:pPr lvl="1"/>
@@ -5785,9 +5772,20 @@
           <a:p>
             <a:r>
               <a:rPr lang="en-US" dirty="0" smtClean="0"/>
-              <a:t>Pull today’s materials from GitHub</a:t>
-            </a:r>
-            <a:endParaRPr lang="en-US" dirty="0"/>
+              <a:t>Pull today’s materials from </a:t>
+            </a:r>
+            <a:r>
+              <a:rPr lang="en-US" dirty="0" smtClean="0"/>
+              <a:t>GitHub</a:t>
+            </a:r>
+          </a:p>
+          <a:p>
+            <a:pPr lvl="1"/>
+            <a:r>
+              <a:rPr lang="en-US" b="1" dirty="0" smtClean="0"/>
+              <a:t>cd  ~/empirical-workshop-2020</a:t>
+            </a:r>
+            <a:endParaRPr lang="en-US" b="1" dirty="0"/>
           </a:p>
           <a:p>
             <a:pPr lvl="1"/>
@@ -5803,8 +5801,24 @@
           <a:p>
             <a:r>
               <a:rPr lang="en-US" dirty="0" smtClean="0"/>
-              <a:t>If you have uncommitted changes</a:t>
-            </a:r>
+              <a:t>If you have uncommitted </a:t>
+            </a:r>
+            <a:r>
+              <a:rPr lang="en-US" dirty="0" smtClean="0"/>
+              <a:t>changes</a:t>
+            </a:r>
+          </a:p>
+          <a:p>
+            <a:pPr lvl="1"/>
+            <a:r>
+              <a:rPr lang="en-US" b="1" dirty="0"/>
+              <a:t>cd </a:t>
+            </a:r>
+            <a:r>
+              <a:rPr lang="en-US" b="1" dirty="0" smtClean="0"/>
+              <a:t> ~/empirical-workshop-2020</a:t>
+            </a:r>
+            <a:endParaRPr lang="en-US" b="1" dirty="0" smtClean="0"/>
           </a:p>
           <a:p>
             <a:pPr lvl="1"/>

</xml_diff>